<commit_message>
First try on Kesktop
First try on Kesktop
</commit_message>
<xml_diff>
--- a/task scheme.pptx
+++ b/task scheme.pptx
@@ -5,7 +5,8 @@
     <p:sldMasterId id="2147483648" r:id="rId1"/>
   </p:sldMasterIdLst>
   <p:sldIdLst>
-    <p:sldId id="257" r:id="rId2"/>
+    <p:sldId id="258" r:id="rId2"/>
+    <p:sldId id="257" r:id="rId3"/>
   </p:sldIdLst>
   <p:sldSz cx="12192000" cy="6858000"/>
   <p:notesSz cx="6858000" cy="9144000"/>
@@ -104,6 +105,11 @@
       </a:defRPr>
     </a:lvl9pPr>
   </p:defaultTextStyle>
+  <p:extLst>
+    <p:ext uri="{EFAFB233-063F-42B5-8137-9DF3F51BA10A}">
+      <p15:sldGuideLst xmlns:p15="http://schemas.microsoft.com/office/powerpoint/2012/main"/>
+    </p:ext>
+  </p:extLst>
 </p:presentation>
 </file>
 
@@ -254,7 +260,7 @@
           <a:p>
             <a:fld id="{CCA6670F-A8A0-407C-A687-5548B9A6F5D7}" type="datetimeFigureOut">
               <a:rPr lang="he-IL" smtClean="0"/>
-              <a:t>כ"א/אב/תשע"ט</a:t>
+              <a:t>י"ב/אלול/תשע"ט</a:t>
             </a:fld>
             <a:endParaRPr lang="he-IL"/>
           </a:p>
@@ -452,7 +458,7 @@
           <a:p>
             <a:fld id="{CCA6670F-A8A0-407C-A687-5548B9A6F5D7}" type="datetimeFigureOut">
               <a:rPr lang="he-IL" smtClean="0"/>
-              <a:t>כ"א/אב/תשע"ט</a:t>
+              <a:t>י"ב/אלול/תשע"ט</a:t>
             </a:fld>
             <a:endParaRPr lang="he-IL"/>
           </a:p>
@@ -660,7 +666,7 @@
           <a:p>
             <a:fld id="{CCA6670F-A8A0-407C-A687-5548B9A6F5D7}" type="datetimeFigureOut">
               <a:rPr lang="he-IL" smtClean="0"/>
-              <a:t>כ"א/אב/תשע"ט</a:t>
+              <a:t>י"ב/אלול/תשע"ט</a:t>
             </a:fld>
             <a:endParaRPr lang="he-IL"/>
           </a:p>
@@ -858,7 +864,7 @@
           <a:p>
             <a:fld id="{CCA6670F-A8A0-407C-A687-5548B9A6F5D7}" type="datetimeFigureOut">
               <a:rPr lang="he-IL" smtClean="0"/>
-              <a:t>כ"א/אב/תשע"ט</a:t>
+              <a:t>י"ב/אלול/תשע"ט</a:t>
             </a:fld>
             <a:endParaRPr lang="he-IL"/>
           </a:p>
@@ -1133,7 +1139,7 @@
           <a:p>
             <a:fld id="{CCA6670F-A8A0-407C-A687-5548B9A6F5D7}" type="datetimeFigureOut">
               <a:rPr lang="he-IL" smtClean="0"/>
-              <a:t>כ"א/אב/תשע"ט</a:t>
+              <a:t>י"ב/אלול/תשע"ט</a:t>
             </a:fld>
             <a:endParaRPr lang="he-IL"/>
           </a:p>
@@ -1398,7 +1404,7 @@
           <a:p>
             <a:fld id="{CCA6670F-A8A0-407C-A687-5548B9A6F5D7}" type="datetimeFigureOut">
               <a:rPr lang="he-IL" smtClean="0"/>
-              <a:t>כ"א/אב/תשע"ט</a:t>
+              <a:t>י"ב/אלול/תשע"ט</a:t>
             </a:fld>
             <a:endParaRPr lang="he-IL"/>
           </a:p>
@@ -1810,7 +1816,7 @@
           <a:p>
             <a:fld id="{CCA6670F-A8A0-407C-A687-5548B9A6F5D7}" type="datetimeFigureOut">
               <a:rPr lang="he-IL" smtClean="0"/>
-              <a:t>כ"א/אב/תשע"ט</a:t>
+              <a:t>י"ב/אלול/תשע"ט</a:t>
             </a:fld>
             <a:endParaRPr lang="he-IL"/>
           </a:p>
@@ -1951,7 +1957,7 @@
           <a:p>
             <a:fld id="{CCA6670F-A8A0-407C-A687-5548B9A6F5D7}" type="datetimeFigureOut">
               <a:rPr lang="he-IL" smtClean="0"/>
-              <a:t>כ"א/אב/תשע"ט</a:t>
+              <a:t>י"ב/אלול/תשע"ט</a:t>
             </a:fld>
             <a:endParaRPr lang="he-IL"/>
           </a:p>
@@ -2064,7 +2070,7 @@
           <a:p>
             <a:fld id="{CCA6670F-A8A0-407C-A687-5548B9A6F5D7}" type="datetimeFigureOut">
               <a:rPr lang="he-IL" smtClean="0"/>
-              <a:t>כ"א/אב/תשע"ט</a:t>
+              <a:t>י"ב/אלול/תשע"ט</a:t>
             </a:fld>
             <a:endParaRPr lang="he-IL"/>
           </a:p>
@@ -2375,7 +2381,7 @@
           <a:p>
             <a:fld id="{CCA6670F-A8A0-407C-A687-5548B9A6F5D7}" type="datetimeFigureOut">
               <a:rPr lang="he-IL" smtClean="0"/>
-              <a:t>כ"א/אב/תשע"ט</a:t>
+              <a:t>י"ב/אלול/תשע"ט</a:t>
             </a:fld>
             <a:endParaRPr lang="he-IL"/>
           </a:p>
@@ -2663,7 +2669,7 @@
           <a:p>
             <a:fld id="{CCA6670F-A8A0-407C-A687-5548B9A6F5D7}" type="datetimeFigureOut">
               <a:rPr lang="he-IL" smtClean="0"/>
-              <a:t>כ"א/אב/תשע"ט</a:t>
+              <a:t>י"ב/אלול/תשע"ט</a:t>
             </a:fld>
             <a:endParaRPr lang="he-IL"/>
           </a:p>
@@ -2904,7 +2910,7 @@
           <a:p>
             <a:fld id="{CCA6670F-A8A0-407C-A687-5548B9A6F5D7}" type="datetimeFigureOut">
               <a:rPr lang="he-IL" smtClean="0"/>
-              <a:t>כ"א/אב/תשע"ט</a:t>
+              <a:t>י"ב/אלול/תשע"ט</a:t>
             </a:fld>
             <a:endParaRPr lang="he-IL"/>
           </a:p>
@@ -3321,6 +3327,74 @@
           <a:chExt cx="0" cy="0"/>
         </a:xfrm>
       </p:grpSpPr>
+      <p:sp>
+        <p:nvSpPr>
+          <p:cNvPr id="2" name="Title 1"/>
+          <p:cNvSpPr>
+            <a:spLocks noGrp="1"/>
+          </p:cNvSpPr>
+          <p:nvPr>
+            <p:ph type="title"/>
+          </p:nvPr>
+        </p:nvSpPr>
+        <p:spPr/>
+        <p:txBody>
+          <a:bodyPr/>
+          <a:lstStyle/>
+          <a:p>
+            <a:endParaRPr lang="he-IL"/>
+          </a:p>
+        </p:txBody>
+      </p:sp>
+      <p:sp>
+        <p:nvSpPr>
+          <p:cNvPr id="3" name="Content Placeholder 2"/>
+          <p:cNvSpPr>
+            <a:spLocks noGrp="1"/>
+          </p:cNvSpPr>
+          <p:nvPr>
+            <p:ph idx="1"/>
+          </p:nvPr>
+        </p:nvSpPr>
+        <p:spPr/>
+        <p:txBody>
+          <a:bodyPr/>
+          <a:lstStyle/>
+          <a:p>
+            <a:endParaRPr lang="he-IL"/>
+          </a:p>
+        </p:txBody>
+      </p:sp>
+    </p:spTree>
+    <p:extLst>
+      <p:ext uri="{BB962C8B-B14F-4D97-AF65-F5344CB8AC3E}">
+        <p14:creationId xmlns:p14="http://schemas.microsoft.com/office/powerpoint/2010/main" val="2373770138"/>
+      </p:ext>
+    </p:extLst>
+  </p:cSld>
+  <p:clrMapOvr>
+    <a:masterClrMapping/>
+  </p:clrMapOvr>
+</p:sld>
+</file>
+
+<file path=ppt/slides/slide2.xml><?xml version="1.0" encoding="utf-8"?>
+<p:sld xmlns:a="http://schemas.openxmlformats.org/drawingml/2006/main" xmlns:r="http://schemas.openxmlformats.org/officeDocument/2006/relationships" xmlns:p="http://schemas.openxmlformats.org/presentationml/2006/main">
+  <p:cSld>
+    <p:spTree>
+      <p:nvGrpSpPr>
+        <p:cNvPr id="1" name=""/>
+        <p:cNvGrpSpPr/>
+        <p:nvPr/>
+      </p:nvGrpSpPr>
+      <p:grpSpPr>
+        <a:xfrm>
+          <a:off x="0" y="0"/>
+          <a:ext cx="0" cy="0"/>
+          <a:chOff x="0" y="0"/>
+          <a:chExt cx="0" cy="0"/>
+        </a:xfrm>
+      </p:grpSpPr>
       <p:grpSp>
         <p:nvGrpSpPr>
           <p:cNvPr id="19" name="קבוצה 18">

</xml_diff>